<commit_message>
squared distance measures for model evaluation
</commit_message>
<xml_diff>
--- a/docs/figure 2.pptx
+++ b/docs/figure 2.pptx
@@ -193,7 +193,7 @@
             <a:fld id="{99A1547A-3FF5-504E-BEF0-D1EA7EDC7D60}" type="datetimeFigureOut">
               <a:rPr lang="en-US" smtClean="0"/>
               <a:pPr/>
-              <a:t>4/30/14</a:t>
+              <a:t>5/9/14</a:t>
             </a:fld>
             <a:endParaRPr lang="en-US"/>
           </a:p>
@@ -723,7 +723,7 @@
             <a:fld id="{33287EDE-16F6-484B-A33C-1CF8F64AC343}" type="datetimeFigureOut">
               <a:rPr lang="en-US" smtClean="0"/>
               <a:pPr/>
-              <a:t>4/30/14</a:t>
+              <a:t>5/9/14</a:t>
             </a:fld>
             <a:endParaRPr lang="en-US"/>
           </a:p>
@@ -890,7 +890,7 @@
             <a:fld id="{33287EDE-16F6-484B-A33C-1CF8F64AC343}" type="datetimeFigureOut">
               <a:rPr lang="en-US" smtClean="0"/>
               <a:pPr/>
-              <a:t>4/30/14</a:t>
+              <a:t>5/9/14</a:t>
             </a:fld>
             <a:endParaRPr lang="en-US"/>
           </a:p>
@@ -1067,7 +1067,7 @@
             <a:fld id="{33287EDE-16F6-484B-A33C-1CF8F64AC343}" type="datetimeFigureOut">
               <a:rPr lang="en-US" smtClean="0"/>
               <a:pPr/>
-              <a:t>4/30/14</a:t>
+              <a:t>5/9/14</a:t>
             </a:fld>
             <a:endParaRPr lang="en-US"/>
           </a:p>
@@ -1234,7 +1234,7 @@
             <a:fld id="{33287EDE-16F6-484B-A33C-1CF8F64AC343}" type="datetimeFigureOut">
               <a:rPr lang="en-US" smtClean="0"/>
               <a:pPr/>
-              <a:t>4/30/14</a:t>
+              <a:t>5/9/14</a:t>
             </a:fld>
             <a:endParaRPr lang="en-US"/>
           </a:p>
@@ -1477,7 +1477,7 @@
             <a:fld id="{33287EDE-16F6-484B-A33C-1CF8F64AC343}" type="datetimeFigureOut">
               <a:rPr lang="en-US" smtClean="0"/>
               <a:pPr/>
-              <a:t>4/30/14</a:t>
+              <a:t>5/9/14</a:t>
             </a:fld>
             <a:endParaRPr lang="en-US"/>
           </a:p>
@@ -1762,7 +1762,7 @@
             <a:fld id="{33287EDE-16F6-484B-A33C-1CF8F64AC343}" type="datetimeFigureOut">
               <a:rPr lang="en-US" smtClean="0"/>
               <a:pPr/>
-              <a:t>4/30/14</a:t>
+              <a:t>5/9/14</a:t>
             </a:fld>
             <a:endParaRPr lang="en-US"/>
           </a:p>
@@ -2186,7 +2186,7 @@
             <a:fld id="{33287EDE-16F6-484B-A33C-1CF8F64AC343}" type="datetimeFigureOut">
               <a:rPr lang="en-US" smtClean="0"/>
               <a:pPr/>
-              <a:t>4/30/14</a:t>
+              <a:t>5/9/14</a:t>
             </a:fld>
             <a:endParaRPr lang="en-US"/>
           </a:p>
@@ -2301,7 +2301,7 @@
             <a:fld id="{33287EDE-16F6-484B-A33C-1CF8F64AC343}" type="datetimeFigureOut">
               <a:rPr lang="en-US" smtClean="0"/>
               <a:pPr/>
-              <a:t>4/30/14</a:t>
+              <a:t>5/9/14</a:t>
             </a:fld>
             <a:endParaRPr lang="en-US"/>
           </a:p>
@@ -2393,7 +2393,7 @@
             <a:fld id="{33287EDE-16F6-484B-A33C-1CF8F64AC343}" type="datetimeFigureOut">
               <a:rPr lang="en-US" smtClean="0"/>
               <a:pPr/>
-              <a:t>4/30/14</a:t>
+              <a:t>5/9/14</a:t>
             </a:fld>
             <a:endParaRPr lang="en-US"/>
           </a:p>
@@ -2667,7 +2667,7 @@
             <a:fld id="{33287EDE-16F6-484B-A33C-1CF8F64AC343}" type="datetimeFigureOut">
               <a:rPr lang="en-US" smtClean="0"/>
               <a:pPr/>
-              <a:t>4/30/14</a:t>
+              <a:t>5/9/14</a:t>
             </a:fld>
             <a:endParaRPr lang="en-US"/>
           </a:p>
@@ -2917,7 +2917,7 @@
             <a:fld id="{33287EDE-16F6-484B-A33C-1CF8F64AC343}" type="datetimeFigureOut">
               <a:rPr lang="en-US" smtClean="0"/>
               <a:pPr/>
-              <a:t>4/30/14</a:t>
+              <a:t>5/9/14</a:t>
             </a:fld>
             <a:endParaRPr lang="en-US"/>
           </a:p>
@@ -3127,7 +3127,7 @@
             <a:fld id="{33287EDE-16F6-484B-A33C-1CF8F64AC343}" type="datetimeFigureOut">
               <a:rPr lang="en-US" smtClean="0"/>
               <a:pPr/>
-              <a:t>4/30/14</a:t>
+              <a:t>5/9/14</a:t>
             </a:fld>
             <a:endParaRPr lang="en-US"/>
           </a:p>
@@ -3506,8 +3506,8 @@
           </p:cNvPicPr>
           <p:nvPr/>
         </p:nvPicPr>
-        <mc:AlternateContent xmlns:ma="http://schemas.microsoft.com/office/mac/drawingml/2008/main">
-          <mc:Choice Requires="ma">
+        <mc:AlternateContent>
+          <mc:Choice xmlns:ma="http://schemas.microsoft.com/office/mac/drawingml/2008/main" Requires="ma">
             <p:blipFill>
               <a:blip r:embed="rId3"/>
               <a:stretch>
@@ -3515,7 +3515,7 @@
               </a:stretch>
             </p:blipFill>
           </mc:Choice>
-          <mc:Fallback xmlns:ma="http://schemas.microsoft.com/office/mac/drawingml/2008/main" xmlns="" xmlns:a="http://schemas.openxmlformats.org/drawingml/2006/main" xmlns:r="http://schemas.openxmlformats.org/officeDocument/2006/relationships" xmlns:mc="http://schemas.openxmlformats.org/markup-compatibility/2006" xmlns:mv="urn:schemas-microsoft-com:mac:vml" xmlns:p="http://schemas.openxmlformats.org/presentationml/2006/main">
+          <mc:Fallback>
             <p:blipFill>
               <a:blip r:embed="rId4"/>
               <a:stretch>
@@ -3526,8 +3526,8 @@
         </mc:AlternateContent>
         <p:spPr>
           <a:xfrm>
-            <a:off x="1460314" y="858487"/>
-            <a:ext cx="2839728" cy="1837058"/>
+            <a:off x="1460370" y="858487"/>
+            <a:ext cx="2839616" cy="1837058"/>
           </a:xfrm>
           <a:prstGeom prst="rect">
             <a:avLst/>
@@ -3542,8 +3542,8 @@
           </p:cNvPicPr>
           <p:nvPr/>
         </p:nvPicPr>
-        <mc:AlternateContent xmlns:ma="http://schemas.microsoft.com/office/mac/drawingml/2008/main">
-          <mc:Choice Requires="ma">
+        <mc:AlternateContent>
+          <mc:Choice xmlns:ma="http://schemas.microsoft.com/office/mac/drawingml/2008/main" Requires="ma">
             <p:blipFill>
               <a:blip r:embed="rId5"/>
               <a:stretch>
@@ -3551,7 +3551,7 @@
               </a:stretch>
             </p:blipFill>
           </mc:Choice>
-          <mc:Fallback xmlns:ma="http://schemas.microsoft.com/office/mac/drawingml/2008/main" xmlns="" xmlns:a="http://schemas.openxmlformats.org/drawingml/2006/main" xmlns:r="http://schemas.openxmlformats.org/officeDocument/2006/relationships" xmlns:mc="http://schemas.openxmlformats.org/markup-compatibility/2006" xmlns:mv="urn:schemas-microsoft-com:mac:vml" xmlns:p="http://schemas.openxmlformats.org/presentationml/2006/main">
+          <mc:Fallback>
             <p:blipFill>
               <a:blip r:embed="rId6"/>
               <a:stretch>
@@ -3562,8 +3562,8 @@
         </mc:AlternateContent>
         <p:spPr>
           <a:xfrm>
-            <a:off x="1460314" y="2667066"/>
-            <a:ext cx="2839728" cy="1837058"/>
+            <a:off x="1460370" y="2667066"/>
+            <a:ext cx="2839616" cy="1837058"/>
           </a:xfrm>
           <a:prstGeom prst="rect">
             <a:avLst/>
@@ -3578,8 +3578,8 @@
           </p:cNvPicPr>
           <p:nvPr/>
         </p:nvPicPr>
-        <mc:AlternateContent xmlns:ma="http://schemas.microsoft.com/office/mac/drawingml/2008/main">
-          <mc:Choice Requires="ma">
+        <mc:AlternateContent>
+          <mc:Choice xmlns:ma="http://schemas.microsoft.com/office/mac/drawingml/2008/main" Requires="ma">
             <p:blipFill>
               <a:blip r:embed="rId7"/>
               <a:stretch>
@@ -3587,7 +3587,7 @@
               </a:stretch>
             </p:blipFill>
           </mc:Choice>
-          <mc:Fallback xmlns:ma="http://schemas.microsoft.com/office/mac/drawingml/2008/main" xmlns="" xmlns:a="http://schemas.openxmlformats.org/drawingml/2006/main" xmlns:r="http://schemas.openxmlformats.org/officeDocument/2006/relationships" xmlns:mc="http://schemas.openxmlformats.org/markup-compatibility/2006" xmlns:mv="urn:schemas-microsoft-com:mac:vml" xmlns:p="http://schemas.openxmlformats.org/presentationml/2006/main">
+          <mc:Fallback>
             <p:blipFill>
               <a:blip r:embed="rId8"/>
               <a:stretch>
@@ -3598,8 +3598,8 @@
         </mc:AlternateContent>
         <p:spPr>
           <a:xfrm>
-            <a:off x="1460314" y="4167310"/>
-            <a:ext cx="2839728" cy="1837058"/>
+            <a:off x="1460370" y="4167310"/>
+            <a:ext cx="2839616" cy="1837058"/>
           </a:xfrm>
           <a:prstGeom prst="rect">
             <a:avLst/>
@@ -3614,8 +3614,8 @@
           </p:cNvPicPr>
           <p:nvPr/>
         </p:nvPicPr>
-        <mc:AlternateContent xmlns:ma="http://schemas.microsoft.com/office/mac/drawingml/2008/main">
-          <mc:Choice Requires="ma">
+        <mc:AlternateContent>
+          <mc:Choice xmlns:ma="http://schemas.microsoft.com/office/mac/drawingml/2008/main" Requires="ma">
             <p:blipFill>
               <a:blip r:embed="rId9"/>
               <a:stretch>
@@ -3623,7 +3623,7 @@
               </a:stretch>
             </p:blipFill>
           </mc:Choice>
-          <mc:Fallback xmlns:ma="http://schemas.microsoft.com/office/mac/drawingml/2008/main" xmlns="" xmlns:a="http://schemas.openxmlformats.org/drawingml/2006/main" xmlns:r="http://schemas.openxmlformats.org/officeDocument/2006/relationships" xmlns:mc="http://schemas.openxmlformats.org/markup-compatibility/2006" xmlns:mv="urn:schemas-microsoft-com:mac:vml" xmlns:p="http://schemas.openxmlformats.org/presentationml/2006/main">
+          <mc:Fallback>
             <p:blipFill>
               <a:blip r:embed="rId10"/>
               <a:stretch>
@@ -3634,8 +3634,8 @@
         </mc:AlternateContent>
         <p:spPr>
           <a:xfrm>
-            <a:off x="1460314" y="6167486"/>
-            <a:ext cx="2839728" cy="2294570"/>
+            <a:off x="1460558" y="6167486"/>
+            <a:ext cx="2839240" cy="2294570"/>
           </a:xfrm>
           <a:prstGeom prst="rect">
             <a:avLst/>
@@ -5256,11 +5256,7 @@
             <a:pPr algn="ctr"/>
             <a:r>
               <a:rPr lang="en-GB" sz="1400" dirty="0" smtClean="0"/>
-              <a:t>#</a:t>
-            </a:r>
-            <a:r>
-              <a:rPr lang="en-GB" sz="1400" dirty="0" smtClean="0"/>
-              <a:t> times</a:t>
+              <a:t># times</a:t>
             </a:r>
             <a:endParaRPr lang="en-US" sz="1400" baseline="-25000" dirty="0"/>
           </a:p>
@@ -5291,11 +5287,7 @@
             <a:pPr algn="ctr"/>
             <a:r>
               <a:rPr lang="en-GB" sz="1400" dirty="0" smtClean="0"/>
-              <a:t>#</a:t>
-            </a:r>
-            <a:r>
-              <a:rPr lang="en-GB" sz="1400" dirty="0" smtClean="0"/>
-              <a:t> times</a:t>
+              <a:t># times</a:t>
             </a:r>
             <a:endParaRPr lang="en-US" sz="1400" baseline="-25000" dirty="0"/>
           </a:p>

</xml_diff>